<commit_message>
ppt content addition 2
</commit_message>
<xml_diff>
--- a/Presentation.pptx
+++ b/Presentation.pptx
@@ -15235,7 +15235,7 @@
                   </a:schemeClr>
                 </a:solidFill>
               </a:rPr>
-              <a:t>Insights for Creating Successful Films</a:t>
+              <a:t>Insights for Creating Successful Movies</a:t>
             </a:r>
           </a:p>
           <a:p>
@@ -20257,7 +20257,7 @@
                   <a:srgbClr val="FFFFFF"/>
                 </a:solidFill>
               </a:rPr>
-              <a:t>In conclusion, this venture stands out to be a wise business proposition, as the revenue to be drawn from this is promising in both the domestic and gross numbers. </a:t>
+              <a:t>In conclusion, this venture stands out to be a wise business venture, as the revenue to be drawn from this is promising in both the domestic and gross numbers. </a:t>
             </a:r>
           </a:p>
           <a:p>
@@ -20285,7 +20285,7 @@
                   <a:srgbClr val="FFFFFF"/>
                 </a:solidFill>
               </a:rPr>
-              <a:t> Collaborate with current leading studios for pilots.</a:t>
+              <a:t>Collaborate with current leading studios for pilots.</a:t>
             </a:r>
             <a:endParaRPr lang="en-KE" sz="2800" dirty="0">
               <a:solidFill>
@@ -22250,7 +22250,7 @@
                 </a:highlight>
                 <a:latin typeface="ui-sans-serif"/>
               </a:rPr>
-              <a:t>As *y  rule of thumb, the columns with missing values that are less than 5%, and the rows with the missing values will be dropped, as this will not significantly impact the analysis.</a:t>
+              <a:t>As my rule of thumb, the columns with missing values that are less than 5%, and the rows with the missing values will be dropped, as this will not significantly impact the analysis.</a:t>
             </a:r>
           </a:p>
           <a:p>
@@ -22278,7 +22278,7 @@
                 </a:highlight>
                 <a:latin typeface="ui-sans-serif"/>
               </a:rPr>
-              <a:t>The mean was used in case there were outliers in both datasets to prevent skewness </a:t>
+              <a:t>The median was used, in this case, there were outliers in both datasets - to prevent skewness </a:t>
             </a:r>
           </a:p>
           <a:p>

</xml_diff>